<commit_message>
updated group lead 2 presentation
updated presentation
</commit_message>
<xml_diff>
--- a/Documents/group_lead_2_presentation.pptx
+++ b/Documents/group_lead_2_presentation.pptx
@@ -5,19 +5,18 @@
     <p:sldMasterId id="2147483678" r:id="rId1"/>
   </p:sldMasterIdLst>
   <p:notesMasterIdLst>
-    <p:notesMasterId r:id="rId12"/>
+    <p:notesMasterId r:id="rId11"/>
   </p:notesMasterIdLst>
   <p:sldIdLst>
     <p:sldId id="256" r:id="rId2"/>
     <p:sldId id="258" r:id="rId3"/>
     <p:sldId id="259" r:id="rId4"/>
-    <p:sldId id="260" r:id="rId5"/>
-    <p:sldId id="261" r:id="rId6"/>
+    <p:sldId id="268" r:id="rId5"/>
+    <p:sldId id="269" r:id="rId6"/>
     <p:sldId id="264" r:id="rId7"/>
     <p:sldId id="265" r:id="rId8"/>
-    <p:sldId id="266" r:id="rId9"/>
-    <p:sldId id="262" r:id="rId10"/>
-    <p:sldId id="263" r:id="rId11"/>
+    <p:sldId id="270" r:id="rId9"/>
+    <p:sldId id="263" r:id="rId10"/>
   </p:sldIdLst>
   <p:sldSz cx="12192000" cy="6858000"/>
   <p:notesSz cx="6858000" cy="9144000"/>
@@ -116,6 +115,11 @@
       </a:defRPr>
     </a:lvl9pPr>
   </p:defaultTextStyle>
+  <p:extLst>
+    <p:ext uri="{EFAFB233-063F-42B5-8137-9DF3F51BA10A}">
+      <p15:sldGuideLst xmlns:p15="http://schemas.microsoft.com/office/powerpoint/2012/main"/>
+    </p:ext>
+  </p:extLst>
 </p:presentation>
 </file>
 
@@ -201,7 +205,7 @@
           <a:p>
             <a:fld id="{24A922D8-8C25-4572-A52E-1AFAE76A69CA}" type="datetimeFigureOut">
               <a:rPr lang="en-US" smtClean="0"/>
-              <a:t>2/26/2019</a:t>
+              <a:t>2/27/2019</a:t>
             </a:fld>
             <a:endParaRPr lang="en-US"/>
           </a:p>
@@ -753,7 +757,7 @@
     </p:spTree>
     <p:extLst>
       <p:ext uri="{BB962C8B-B14F-4D97-AF65-F5344CB8AC3E}">
-        <p14:creationId xmlns:p14="http://schemas.microsoft.com/office/powerpoint/2010/main" val="2056828556"/>
+        <p14:creationId xmlns:p14="http://schemas.microsoft.com/office/powerpoint/2010/main" val="3314568978"/>
       </p:ext>
     </p:extLst>
   </p:cSld>
@@ -857,7 +861,7 @@
     </p:spTree>
     <p:extLst>
       <p:ext uri="{BB962C8B-B14F-4D97-AF65-F5344CB8AC3E}">
-        <p14:creationId xmlns:p14="http://schemas.microsoft.com/office/powerpoint/2010/main" val="3950259369"/>
+        <p14:creationId xmlns:p14="http://schemas.microsoft.com/office/powerpoint/2010/main" val="1747953030"/>
       </p:ext>
     </p:extLst>
   </p:cSld>
@@ -1169,7 +1173,7 @@
     </p:spTree>
     <p:extLst>
       <p:ext uri="{BB962C8B-B14F-4D97-AF65-F5344CB8AC3E}">
-        <p14:creationId xmlns:p14="http://schemas.microsoft.com/office/powerpoint/2010/main" val="575287454"/>
+        <p14:creationId xmlns:p14="http://schemas.microsoft.com/office/powerpoint/2010/main" val="2387479226"/>
       </p:ext>
     </p:extLst>
   </p:cSld>
@@ -1265,110 +1269,6 @@
             <a:fld id="{5177A797-855A-40CF-8B31-CBC5F280C220}" type="slidenum">
               <a:rPr lang="en-US" smtClean="0"/>
               <a:t>9</a:t>
-            </a:fld>
-            <a:endParaRPr lang="en-US"/>
-          </a:p>
-        </p:txBody>
-      </p:sp>
-    </p:spTree>
-    <p:extLst>
-      <p:ext uri="{BB962C8B-B14F-4D97-AF65-F5344CB8AC3E}">
-        <p14:creationId xmlns:p14="http://schemas.microsoft.com/office/powerpoint/2010/main" val="858185740"/>
-      </p:ext>
-    </p:extLst>
-  </p:cSld>
-  <p:clrMapOvr>
-    <a:masterClrMapping/>
-  </p:clrMapOvr>
-</p:notes>
-</file>
-
-<file path=ppt/notesSlides/notesSlide9.xml><?xml version="1.0" encoding="utf-8"?>
-<p:notes xmlns:a="http://schemas.openxmlformats.org/drawingml/2006/main" xmlns:r="http://schemas.openxmlformats.org/officeDocument/2006/relationships" xmlns:p="http://schemas.openxmlformats.org/presentationml/2006/main">
-  <p:cSld>
-    <p:spTree>
-      <p:nvGrpSpPr>
-        <p:cNvPr id="1" name=""/>
-        <p:cNvGrpSpPr/>
-        <p:nvPr/>
-      </p:nvGrpSpPr>
-      <p:grpSpPr>
-        <a:xfrm>
-          <a:off x="0" y="0"/>
-          <a:ext cx="0" cy="0"/>
-          <a:chOff x="0" y="0"/>
-          <a:chExt cx="0" cy="0"/>
-        </a:xfrm>
-      </p:grpSpPr>
-      <p:sp>
-        <p:nvSpPr>
-          <p:cNvPr id="2" name="Slide Image Placeholder 1"/>
-          <p:cNvSpPr>
-            <a:spLocks noGrp="1" noRot="1" noChangeAspect="1"/>
-          </p:cNvSpPr>
-          <p:nvPr>
-            <p:ph type="sldImg"/>
-          </p:nvPr>
-        </p:nvSpPr>
-        <p:spPr/>
-      </p:sp>
-      <p:sp>
-        <p:nvSpPr>
-          <p:cNvPr id="3" name="Notes Placeholder 2"/>
-          <p:cNvSpPr>
-            <a:spLocks noGrp="1"/>
-          </p:cNvSpPr>
-          <p:nvPr>
-            <p:ph type="body" idx="1"/>
-          </p:nvPr>
-        </p:nvSpPr>
-        <p:spPr/>
-        <p:txBody>
-          <a:bodyPr/>
-          <a:lstStyle/>
-          <a:p>
-            <a:pPr marL="0" marR="0" lvl="0" indent="0" algn="l" defTabSz="914400" rtl="0" eaLnBrk="1" fontAlgn="auto" latinLnBrk="0" hangingPunct="1">
-              <a:lnSpc>
-                <a:spcPct val="100000"/>
-              </a:lnSpc>
-              <a:spcBef>
-                <a:spcPts val="0"/>
-              </a:spcBef>
-              <a:spcAft>
-                <a:spcPts val="0"/>
-              </a:spcAft>
-              <a:buClrTx/>
-              <a:buSzTx/>
-              <a:buFontTx/>
-              <a:buNone/>
-              <a:tabLst/>
-              <a:defRPr/>
-            </a:pPr>
-            <a:r>
-              <a:rPr lang="en-US" dirty="0"/>
-              <a:t>https://github.com/scouter238/Maze_Runner</a:t>
-            </a:r>
-          </a:p>
-        </p:txBody>
-      </p:sp>
-      <p:sp>
-        <p:nvSpPr>
-          <p:cNvPr id="4" name="Slide Number Placeholder 3"/>
-          <p:cNvSpPr>
-            <a:spLocks noGrp="1"/>
-          </p:cNvSpPr>
-          <p:nvPr>
-            <p:ph type="sldNum" sz="quarter" idx="5"/>
-          </p:nvPr>
-        </p:nvSpPr>
-        <p:spPr/>
-        <p:txBody>
-          <a:bodyPr/>
-          <a:lstStyle/>
-          <a:p>
-            <a:fld id="{5177A797-855A-40CF-8B31-CBC5F280C220}" type="slidenum">
-              <a:rPr lang="en-US" smtClean="0"/>
-              <a:t>10</a:t>
             </a:fld>
             <a:endParaRPr lang="en-US"/>
           </a:p>
@@ -1889,7 +1789,7 @@
           <a:p>
             <a:fld id="{A459104C-FC2A-47CF-8937-40CDE8AE55FD}" type="datetimeFigureOut">
               <a:rPr lang="en-US" smtClean="0"/>
-              <a:t>2/26/2019</a:t>
+              <a:t>2/27/2019</a:t>
             </a:fld>
             <a:endParaRPr lang="en-US"/>
           </a:p>
@@ -2185,7 +2085,7 @@
           <a:p>
             <a:fld id="{A459104C-FC2A-47CF-8937-40CDE8AE55FD}" type="datetimeFigureOut">
               <a:rPr lang="en-US" smtClean="0"/>
-              <a:t>2/26/2019</a:t>
+              <a:t>2/27/2019</a:t>
             </a:fld>
             <a:endParaRPr lang="en-US"/>
           </a:p>
@@ -2433,7 +2333,7 @@
           <a:p>
             <a:fld id="{A459104C-FC2A-47CF-8937-40CDE8AE55FD}" type="datetimeFigureOut">
               <a:rPr lang="en-US" smtClean="0"/>
-              <a:t>2/26/2019</a:t>
+              <a:t>2/27/2019</a:t>
             </a:fld>
             <a:endParaRPr lang="en-US"/>
           </a:p>
@@ -2973,7 +2873,7 @@
           <a:p>
             <a:fld id="{A459104C-FC2A-47CF-8937-40CDE8AE55FD}" type="datetimeFigureOut">
               <a:rPr lang="en-US" smtClean="0"/>
-              <a:t>2/26/2019</a:t>
+              <a:t>2/27/2019</a:t>
             </a:fld>
             <a:endParaRPr lang="en-US"/>
           </a:p>
@@ -3221,7 +3121,7 @@
           <a:p>
             <a:fld id="{A459104C-FC2A-47CF-8937-40CDE8AE55FD}" type="datetimeFigureOut">
               <a:rPr lang="en-US" smtClean="0"/>
-              <a:t>2/26/2019</a:t>
+              <a:t>2/27/2019</a:t>
             </a:fld>
             <a:endParaRPr lang="en-US"/>
           </a:p>
@@ -3753,7 +3653,7 @@
           <a:p>
             <a:fld id="{A459104C-FC2A-47CF-8937-40CDE8AE55FD}" type="datetimeFigureOut">
               <a:rPr lang="en-US" smtClean="0"/>
-              <a:t>2/26/2019</a:t>
+              <a:t>2/27/2019</a:t>
             </a:fld>
             <a:endParaRPr lang="en-US"/>
           </a:p>
@@ -4050,7 +3950,7 @@
           <a:p>
             <a:fld id="{A459104C-FC2A-47CF-8937-40CDE8AE55FD}" type="datetimeFigureOut">
               <a:rPr lang="en-US" smtClean="0"/>
-              <a:t>2/26/2019</a:t>
+              <a:t>2/27/2019</a:t>
             </a:fld>
             <a:endParaRPr lang="en-US"/>
           </a:p>
@@ -4224,7 +4124,7 @@
           <a:p>
             <a:fld id="{A459104C-FC2A-47CF-8937-40CDE8AE55FD}" type="datetimeFigureOut">
               <a:rPr lang="en-US" smtClean="0"/>
-              <a:t>2/26/2019</a:t>
+              <a:t>2/27/2019</a:t>
             </a:fld>
             <a:endParaRPr lang="en-US"/>
           </a:p>
@@ -4404,7 +4304,7 @@
           <a:p>
             <a:fld id="{A459104C-FC2A-47CF-8937-40CDE8AE55FD}" type="datetimeFigureOut">
               <a:rPr lang="en-US" smtClean="0"/>
-              <a:t>2/26/2019</a:t>
+              <a:t>2/27/2019</a:t>
             </a:fld>
             <a:endParaRPr lang="en-US"/>
           </a:p>
@@ -4574,7 +4474,7 @@
           <a:p>
             <a:fld id="{A459104C-FC2A-47CF-8937-40CDE8AE55FD}" type="datetimeFigureOut">
               <a:rPr lang="en-US" smtClean="0"/>
-              <a:t>2/26/2019</a:t>
+              <a:t>2/27/2019</a:t>
             </a:fld>
             <a:endParaRPr lang="en-US"/>
           </a:p>
@@ -4825,7 +4725,7 @@
           <a:p>
             <a:fld id="{A459104C-FC2A-47CF-8937-40CDE8AE55FD}" type="datetimeFigureOut">
               <a:rPr lang="en-US" smtClean="0"/>
-              <a:t>2/26/2019</a:t>
+              <a:t>2/27/2019</a:t>
             </a:fld>
             <a:endParaRPr lang="en-US"/>
           </a:p>
@@ -5122,7 +5022,7 @@
           <a:p>
             <a:fld id="{A459104C-FC2A-47CF-8937-40CDE8AE55FD}" type="datetimeFigureOut">
               <a:rPr lang="en-US" smtClean="0"/>
-              <a:t>2/26/2019</a:t>
+              <a:t>2/27/2019</a:t>
             </a:fld>
             <a:endParaRPr lang="en-US"/>
           </a:p>
@@ -5564,7 +5464,7 @@
           <a:p>
             <a:fld id="{A459104C-FC2A-47CF-8937-40CDE8AE55FD}" type="datetimeFigureOut">
               <a:rPr lang="en-US" smtClean="0"/>
-              <a:t>2/26/2019</a:t>
+              <a:t>2/27/2019</a:t>
             </a:fld>
             <a:endParaRPr lang="en-US"/>
           </a:p>
@@ -5682,7 +5582,7 @@
           <a:p>
             <a:fld id="{A459104C-FC2A-47CF-8937-40CDE8AE55FD}" type="datetimeFigureOut">
               <a:rPr lang="en-US" smtClean="0"/>
-              <a:t>2/26/2019</a:t>
+              <a:t>2/27/2019</a:t>
             </a:fld>
             <a:endParaRPr lang="en-US"/>
           </a:p>
@@ -5777,7 +5677,7 @@
           <a:p>
             <a:fld id="{A459104C-FC2A-47CF-8937-40CDE8AE55FD}" type="datetimeFigureOut">
               <a:rPr lang="en-US" smtClean="0"/>
-              <a:t>2/26/2019</a:t>
+              <a:t>2/27/2019</a:t>
             </a:fld>
             <a:endParaRPr lang="en-US"/>
           </a:p>
@@ -6060,7 +5960,7 @@
           <a:p>
             <a:fld id="{A459104C-FC2A-47CF-8937-40CDE8AE55FD}" type="datetimeFigureOut">
               <a:rPr lang="en-US" smtClean="0"/>
-              <a:t>2/26/2019</a:t>
+              <a:t>2/27/2019</a:t>
             </a:fld>
             <a:endParaRPr lang="en-US"/>
           </a:p>
@@ -6351,7 +6251,7 @@
           <a:p>
             <a:fld id="{A459104C-FC2A-47CF-8937-40CDE8AE55FD}" type="datetimeFigureOut">
               <a:rPr lang="en-US" smtClean="0"/>
-              <a:t>2/26/2019</a:t>
+              <a:t>2/27/2019</a:t>
             </a:fld>
             <a:endParaRPr lang="en-US"/>
           </a:p>
@@ -6881,7 +6781,7 @@
           <a:p>
             <a:fld id="{A459104C-FC2A-47CF-8937-40CDE8AE55FD}" type="datetimeFigureOut">
               <a:rPr lang="en-US" smtClean="0"/>
-              <a:t>2/26/2019</a:t>
+              <a:t>2/27/2019</a:t>
             </a:fld>
             <a:endParaRPr lang="en-US"/>
           </a:p>
@@ -7499,7 +7399,7 @@
         </p:nvSpPr>
         <p:spPr>
           <a:xfrm>
-            <a:off x="3873694" y="3996268"/>
+            <a:off x="3873694" y="2621282"/>
             <a:ext cx="6987645" cy="1388534"/>
           </a:xfrm>
         </p:spPr>
@@ -7509,7 +7409,10 @@
           </a:bodyPr>
           <a:lstStyle/>
           <a:p>
-            <a:endParaRPr lang="en-US" sz="3000" dirty="0"/>
+            <a:r>
+              <a:rPr lang="en-US" sz="3000" dirty="0"/>
+              <a:t>Minimum Viable Product Edition</a:t>
+            </a:r>
           </a:p>
         </p:txBody>
       </p:sp>
@@ -7564,480 +7467,6 @@
     <p:extLst>
       <p:ext uri="{BB962C8B-B14F-4D97-AF65-F5344CB8AC3E}">
         <p14:creationId xmlns:p14="http://schemas.microsoft.com/office/powerpoint/2010/main" val="540658451"/>
-      </p:ext>
-    </p:extLst>
-  </p:cSld>
-  <p:clrMapOvr>
-    <a:masterClrMapping/>
-  </p:clrMapOvr>
-</p:sld>
-</file>
-
-<file path=ppt/slides/slide10.xml><?xml version="1.0" encoding="utf-8"?>
-<p:sld xmlns:a="http://schemas.openxmlformats.org/drawingml/2006/main" xmlns:r="http://schemas.openxmlformats.org/officeDocument/2006/relationships" xmlns:p="http://schemas.openxmlformats.org/presentationml/2006/main">
-  <p:cSld>
-    <p:spTree>
-      <p:nvGrpSpPr>
-        <p:cNvPr id="1" name=""/>
-        <p:cNvGrpSpPr/>
-        <p:nvPr/>
-      </p:nvGrpSpPr>
-      <p:grpSpPr>
-        <a:xfrm>
-          <a:off x="0" y="0"/>
-          <a:ext cx="0" cy="0"/>
-          <a:chOff x="0" y="0"/>
-          <a:chExt cx="0" cy="0"/>
-        </a:xfrm>
-      </p:grpSpPr>
-      <p:pic>
-        <p:nvPicPr>
-          <p:cNvPr id="1026" name="Picture 2">
-            <a:extLst>
-              <a:ext uri="{FF2B5EF4-FFF2-40B4-BE49-F238E27FC236}">
-                <a16:creationId xmlns:a16="http://schemas.microsoft.com/office/drawing/2014/main" id="{4FD81E40-2476-4A4A-ADDC-438285B9C548}"/>
-              </a:ext>
-            </a:extLst>
-          </p:cNvPr>
-          <p:cNvPicPr>
-            <a:picLocks noChangeAspect="1" noChangeArrowheads="1"/>
-          </p:cNvPicPr>
-          <p:nvPr/>
-        </p:nvPicPr>
-        <p:blipFill>
-          <a:blip r:embed="rId3">
-            <a:extLst>
-              <a:ext uri="{28A0092B-C50C-407E-A947-70E740481C1C}">
-                <a14:useLocalDpi xmlns:a14="http://schemas.microsoft.com/office/drawing/2010/main" val="0"/>
-              </a:ext>
-            </a:extLst>
-          </a:blip>
-          <a:srcRect/>
-          <a:stretch>
-            <a:fillRect/>
-          </a:stretch>
-        </p:blipFill>
-        <p:spPr bwMode="auto">
-          <a:xfrm>
-            <a:off x="0" y="4371474"/>
-            <a:ext cx="2486526" cy="2486526"/>
-          </a:xfrm>
-          <a:prstGeom prst="rect">
-            <a:avLst/>
-          </a:prstGeom>
-          <a:noFill/>
-          <a:extLst>
-            <a:ext uri="{909E8E84-426E-40DD-AFC4-6F175D3DCCD1}">
-              <a14:hiddenFill xmlns:a14="http://schemas.microsoft.com/office/drawing/2010/main">
-                <a:solidFill>
-                  <a:srgbClr val="FFFFFF"/>
-                </a:solidFill>
-              </a14:hiddenFill>
-            </a:ext>
-          </a:extLst>
-        </p:spPr>
-      </p:pic>
-      <p:sp>
-        <p:nvSpPr>
-          <p:cNvPr id="5" name="Title 1">
-            <a:extLst>
-              <a:ext uri="{FF2B5EF4-FFF2-40B4-BE49-F238E27FC236}">
-                <a16:creationId xmlns:a16="http://schemas.microsoft.com/office/drawing/2014/main" id="{DC616E08-85EA-4F29-A757-C5072AF65CEF}"/>
-              </a:ext>
-            </a:extLst>
-          </p:cNvPr>
-          <p:cNvSpPr txBox="1">
-            <a:spLocks/>
-          </p:cNvSpPr>
-          <p:nvPr/>
-        </p:nvSpPr>
-        <p:spPr>
-          <a:xfrm>
-            <a:off x="721895" y="1423738"/>
-            <a:ext cx="10018713" cy="1752599"/>
-          </a:xfrm>
-          <a:prstGeom prst="rect">
-            <a:avLst/>
-          </a:prstGeom>
-          <a:effectLst/>
-        </p:spPr>
-        <p:txBody>
-          <a:bodyPr vert="horz" lIns="91440" tIns="45720" rIns="91440" bIns="45720" rtlCol="0" anchor="b">
-            <a:normAutofit/>
-          </a:bodyPr>
-          <a:lstStyle>
-            <a:lvl1pPr algn="r" defTabSz="457200" rtl="0" eaLnBrk="1" latinLnBrk="0" hangingPunct="1">
-              <a:spcBef>
-                <a:spcPct val="0"/>
-              </a:spcBef>
-              <a:buNone/>
-              <a:defRPr sz="6000" kern="1200" cap="none">
-                <a:ln w="3175" cmpd="sng">
-                  <a:noFill/>
-                </a:ln>
-                <a:solidFill>
-                  <a:schemeClr val="tx1"/>
-                </a:solidFill>
-                <a:effectLst/>
-                <a:latin typeface="+mj-lt"/>
-                <a:ea typeface="+mj-ea"/>
-                <a:cs typeface="+mj-cs"/>
-              </a:defRPr>
-            </a:lvl1pPr>
-            <a:lvl2pPr eaLnBrk="1" hangingPunct="1">
-              <a:defRPr>
-                <a:solidFill>
-                  <a:schemeClr val="tx2"/>
-                </a:solidFill>
-              </a:defRPr>
-            </a:lvl2pPr>
-            <a:lvl3pPr eaLnBrk="1" hangingPunct="1">
-              <a:defRPr>
-                <a:solidFill>
-                  <a:schemeClr val="tx2"/>
-                </a:solidFill>
-              </a:defRPr>
-            </a:lvl3pPr>
-            <a:lvl4pPr eaLnBrk="1" hangingPunct="1">
-              <a:defRPr>
-                <a:solidFill>
-                  <a:schemeClr val="tx2"/>
-                </a:solidFill>
-              </a:defRPr>
-            </a:lvl4pPr>
-            <a:lvl5pPr eaLnBrk="1" hangingPunct="1">
-              <a:defRPr>
-                <a:solidFill>
-                  <a:schemeClr val="tx2"/>
-                </a:solidFill>
-              </a:defRPr>
-            </a:lvl5pPr>
-            <a:lvl6pPr eaLnBrk="1" hangingPunct="1">
-              <a:defRPr>
-                <a:solidFill>
-                  <a:schemeClr val="tx2"/>
-                </a:solidFill>
-              </a:defRPr>
-            </a:lvl6pPr>
-            <a:lvl7pPr eaLnBrk="1" hangingPunct="1">
-              <a:defRPr>
-                <a:solidFill>
-                  <a:schemeClr val="tx2"/>
-                </a:solidFill>
-              </a:defRPr>
-            </a:lvl7pPr>
-            <a:lvl8pPr eaLnBrk="1" hangingPunct="1">
-              <a:defRPr>
-                <a:solidFill>
-                  <a:schemeClr val="tx2"/>
-                </a:solidFill>
-              </a:defRPr>
-            </a:lvl8pPr>
-            <a:lvl9pPr eaLnBrk="1" hangingPunct="1">
-              <a:defRPr>
-                <a:solidFill>
-                  <a:schemeClr val="tx2"/>
-                </a:solidFill>
-              </a:defRPr>
-            </a:lvl9pPr>
-          </a:lstStyle>
-          <a:p>
-            <a:r>
-              <a:rPr lang="en-US" dirty="0">
-                <a:solidFill>
-                  <a:schemeClr val="accent1">
-                    <a:lumMod val="75000"/>
-                  </a:schemeClr>
-                </a:solidFill>
-              </a:rPr>
-              <a:t>conclusion</a:t>
-            </a:r>
-          </a:p>
-        </p:txBody>
-      </p:sp>
-      <p:sp>
-        <p:nvSpPr>
-          <p:cNvPr id="8" name="Content Placeholder 2">
-            <a:extLst>
-              <a:ext uri="{FF2B5EF4-FFF2-40B4-BE49-F238E27FC236}">
-                <a16:creationId xmlns:a16="http://schemas.microsoft.com/office/drawing/2014/main" id="{F9D38175-74E0-4F9F-AFFA-E064B9750BAE}"/>
-              </a:ext>
-            </a:extLst>
-          </p:cNvPr>
-          <p:cNvSpPr txBox="1">
-            <a:spLocks/>
-          </p:cNvSpPr>
-          <p:nvPr/>
-        </p:nvSpPr>
-        <p:spPr>
-          <a:xfrm>
-            <a:off x="2173287" y="1981201"/>
-            <a:ext cx="10018713" cy="3124201"/>
-          </a:xfrm>
-          <a:prstGeom prst="rect">
-            <a:avLst/>
-          </a:prstGeom>
-        </p:spPr>
-        <p:txBody>
-          <a:bodyPr vert="horz" lIns="91440" tIns="45720" rIns="91440" bIns="45720" rtlCol="0" anchor="t">
-            <a:normAutofit/>
-          </a:bodyPr>
-          <a:lstStyle>
-            <a:lvl1pPr marL="0" indent="0" algn="r" defTabSz="457200" rtl="0" eaLnBrk="1" latinLnBrk="0" hangingPunct="1">
-              <a:spcBef>
-                <a:spcPct val="20000"/>
-              </a:spcBef>
-              <a:spcAft>
-                <a:spcPts val="600"/>
-              </a:spcAft>
-              <a:buClr>
-                <a:schemeClr val="accent1">
-                  <a:lumMod val="75000"/>
-                </a:schemeClr>
-              </a:buClr>
-              <a:buSzPct val="145000"/>
-              <a:buFont typeface="Arial"/>
-              <a:buNone/>
-              <a:defRPr sz="2100" kern="1200" cap="none">
-                <a:solidFill>
-                  <a:schemeClr val="tx1"/>
-                </a:solidFill>
-                <a:effectLst/>
-                <a:latin typeface="+mn-lt"/>
-                <a:ea typeface="+mn-ea"/>
-                <a:cs typeface="+mn-cs"/>
-              </a:defRPr>
-            </a:lvl1pPr>
-            <a:lvl2pPr marL="457200" indent="0" algn="ctr" defTabSz="457200" rtl="0" eaLnBrk="1" latinLnBrk="0" hangingPunct="1">
-              <a:spcBef>
-                <a:spcPct val="20000"/>
-              </a:spcBef>
-              <a:spcAft>
-                <a:spcPts val="600"/>
-              </a:spcAft>
-              <a:buClr>
-                <a:schemeClr val="accent1">
-                  <a:lumMod val="75000"/>
-                </a:schemeClr>
-              </a:buClr>
-              <a:buSzPct val="145000"/>
-              <a:buFont typeface="Arial"/>
-              <a:buNone/>
-              <a:defRPr sz="2000" kern="1200" cap="none">
-                <a:solidFill>
-                  <a:schemeClr val="tx1">
-                    <a:tint val="75000"/>
-                  </a:schemeClr>
-                </a:solidFill>
-                <a:effectLst/>
-                <a:latin typeface="+mn-lt"/>
-                <a:ea typeface="+mn-ea"/>
-                <a:cs typeface="+mn-cs"/>
-              </a:defRPr>
-            </a:lvl2pPr>
-            <a:lvl3pPr marL="914400" indent="0" algn="ctr" defTabSz="457200" rtl="0" eaLnBrk="1" latinLnBrk="0" hangingPunct="1">
-              <a:spcBef>
-                <a:spcPct val="20000"/>
-              </a:spcBef>
-              <a:spcAft>
-                <a:spcPts val="600"/>
-              </a:spcAft>
-              <a:buClr>
-                <a:schemeClr val="accent1">
-                  <a:lumMod val="75000"/>
-                </a:schemeClr>
-              </a:buClr>
-              <a:buSzPct val="145000"/>
-              <a:buFont typeface="Arial"/>
-              <a:buNone/>
-              <a:defRPr sz="1800" kern="1200" cap="none">
-                <a:solidFill>
-                  <a:schemeClr val="tx1">
-                    <a:tint val="75000"/>
-                  </a:schemeClr>
-                </a:solidFill>
-                <a:effectLst/>
-                <a:latin typeface="+mn-lt"/>
-                <a:ea typeface="+mn-ea"/>
-                <a:cs typeface="+mn-cs"/>
-              </a:defRPr>
-            </a:lvl3pPr>
-            <a:lvl4pPr marL="1371600" indent="0" algn="ctr" defTabSz="457200" rtl="0" eaLnBrk="1" latinLnBrk="0" hangingPunct="1">
-              <a:spcBef>
-                <a:spcPct val="20000"/>
-              </a:spcBef>
-              <a:spcAft>
-                <a:spcPts val="600"/>
-              </a:spcAft>
-              <a:buClr>
-                <a:schemeClr val="accent1">
-                  <a:lumMod val="75000"/>
-                </a:schemeClr>
-              </a:buClr>
-              <a:buSzPct val="145000"/>
-              <a:buFont typeface="Arial"/>
-              <a:buNone/>
-              <a:defRPr sz="1600" kern="1200" cap="none">
-                <a:solidFill>
-                  <a:schemeClr val="tx1">
-                    <a:tint val="75000"/>
-                  </a:schemeClr>
-                </a:solidFill>
-                <a:effectLst/>
-                <a:latin typeface="+mn-lt"/>
-                <a:ea typeface="+mn-ea"/>
-                <a:cs typeface="+mn-cs"/>
-              </a:defRPr>
-            </a:lvl4pPr>
-            <a:lvl5pPr marL="1828800" indent="0" algn="ctr" defTabSz="457200" rtl="0" eaLnBrk="1" latinLnBrk="0" hangingPunct="1">
-              <a:spcBef>
-                <a:spcPct val="20000"/>
-              </a:spcBef>
-              <a:spcAft>
-                <a:spcPts val="600"/>
-              </a:spcAft>
-              <a:buClr>
-                <a:schemeClr val="accent1">
-                  <a:lumMod val="75000"/>
-                </a:schemeClr>
-              </a:buClr>
-              <a:buSzPct val="145000"/>
-              <a:buFont typeface="Arial"/>
-              <a:buNone/>
-              <a:defRPr sz="1400" kern="1200" cap="none">
-                <a:solidFill>
-                  <a:schemeClr val="tx1">
-                    <a:tint val="75000"/>
-                  </a:schemeClr>
-                </a:solidFill>
-                <a:effectLst/>
-                <a:latin typeface="+mn-lt"/>
-                <a:ea typeface="+mn-ea"/>
-                <a:cs typeface="+mn-cs"/>
-              </a:defRPr>
-            </a:lvl5pPr>
-            <a:lvl6pPr marL="2286000" indent="0" algn="ctr" defTabSz="457200" rtl="0" eaLnBrk="1" latinLnBrk="0" hangingPunct="1">
-              <a:spcBef>
-                <a:spcPct val="20000"/>
-              </a:spcBef>
-              <a:spcAft>
-                <a:spcPts val="600"/>
-              </a:spcAft>
-              <a:buClr>
-                <a:schemeClr val="accent1">
-                  <a:lumMod val="75000"/>
-                </a:schemeClr>
-              </a:buClr>
-              <a:buSzPct val="145000"/>
-              <a:buFont typeface="Arial"/>
-              <a:buNone/>
-              <a:defRPr sz="1400" kern="1200" cap="none">
-                <a:solidFill>
-                  <a:schemeClr val="tx1">
-                    <a:tint val="75000"/>
-                  </a:schemeClr>
-                </a:solidFill>
-                <a:effectLst/>
-                <a:latin typeface="+mn-lt"/>
-                <a:ea typeface="+mn-ea"/>
-                <a:cs typeface="+mn-cs"/>
-              </a:defRPr>
-            </a:lvl6pPr>
-            <a:lvl7pPr marL="2743200" indent="0" algn="ctr" defTabSz="457200" rtl="0" eaLnBrk="1" latinLnBrk="0" hangingPunct="1">
-              <a:spcBef>
-                <a:spcPct val="20000"/>
-              </a:spcBef>
-              <a:spcAft>
-                <a:spcPts val="600"/>
-              </a:spcAft>
-              <a:buClr>
-                <a:schemeClr val="accent1">
-                  <a:lumMod val="75000"/>
-                </a:schemeClr>
-              </a:buClr>
-              <a:buSzPct val="145000"/>
-              <a:buFont typeface="Arial"/>
-              <a:buNone/>
-              <a:defRPr sz="1400" kern="1200" cap="none">
-                <a:solidFill>
-                  <a:schemeClr val="tx1">
-                    <a:tint val="75000"/>
-                  </a:schemeClr>
-                </a:solidFill>
-                <a:effectLst/>
-                <a:latin typeface="+mn-lt"/>
-                <a:ea typeface="+mn-ea"/>
-                <a:cs typeface="+mn-cs"/>
-              </a:defRPr>
-            </a:lvl7pPr>
-            <a:lvl8pPr marL="3200400" indent="0" algn="ctr" defTabSz="457200" rtl="0" eaLnBrk="1" latinLnBrk="0" hangingPunct="1">
-              <a:spcBef>
-                <a:spcPct val="20000"/>
-              </a:spcBef>
-              <a:spcAft>
-                <a:spcPts val="600"/>
-              </a:spcAft>
-              <a:buClr>
-                <a:schemeClr val="accent1">
-                  <a:lumMod val="75000"/>
-                </a:schemeClr>
-              </a:buClr>
-              <a:buSzPct val="145000"/>
-              <a:buFont typeface="Arial"/>
-              <a:buNone/>
-              <a:defRPr sz="1400" kern="1200" cap="none">
-                <a:solidFill>
-                  <a:schemeClr val="tx1">
-                    <a:tint val="75000"/>
-                  </a:schemeClr>
-                </a:solidFill>
-                <a:effectLst/>
-                <a:latin typeface="+mn-lt"/>
-                <a:ea typeface="+mn-ea"/>
-                <a:cs typeface="+mn-cs"/>
-              </a:defRPr>
-            </a:lvl8pPr>
-            <a:lvl9pPr marL="3657600" indent="0" algn="ctr" defTabSz="457200" rtl="0" eaLnBrk="1" latinLnBrk="0" hangingPunct="1">
-              <a:spcBef>
-                <a:spcPct val="20000"/>
-              </a:spcBef>
-              <a:spcAft>
-                <a:spcPts val="600"/>
-              </a:spcAft>
-              <a:buClr>
-                <a:schemeClr val="accent1">
-                  <a:lumMod val="75000"/>
-                </a:schemeClr>
-              </a:buClr>
-              <a:buSzPct val="145000"/>
-              <a:buFont typeface="Arial"/>
-              <a:buNone/>
-              <a:defRPr sz="1400" kern="1200" cap="none">
-                <a:solidFill>
-                  <a:schemeClr val="tx1">
-                    <a:tint val="75000"/>
-                  </a:schemeClr>
-                </a:solidFill>
-                <a:effectLst/>
-                <a:latin typeface="+mn-lt"/>
-                <a:ea typeface="+mn-ea"/>
-                <a:cs typeface="+mn-cs"/>
-              </a:defRPr>
-            </a:lvl9pPr>
-          </a:lstStyle>
-          <a:p>
-            <a:pPr marL="457200" indent="-457200" algn="l">
-              <a:buFont typeface="Arial" panose="020B0604020202020204" pitchFamily="34" charset="0"/>
-              <a:buChar char="•"/>
-            </a:pPr>
-            <a:endParaRPr lang="en-US" sz="3200" dirty="0"/>
-          </a:p>
-        </p:txBody>
-      </p:sp>
-    </p:spTree>
-    <p:extLst>
-      <p:ext uri="{BB962C8B-B14F-4D97-AF65-F5344CB8AC3E}">
-        <p14:creationId xmlns:p14="http://schemas.microsoft.com/office/powerpoint/2010/main" val="1190623124"/>
       </p:ext>
     </p:extLst>
   </p:cSld>
@@ -8624,7 +8053,7 @@
         </p:nvSpPr>
         <p:spPr>
           <a:xfrm>
-            <a:off x="-1459831" y="-58151"/>
+            <a:off x="1086643" y="1104901"/>
             <a:ext cx="10018713" cy="1752599"/>
           </a:xfrm>
           <a:prstGeom prst="rect">
@@ -8634,7 +8063,7 @@
         </p:spPr>
         <p:txBody>
           <a:bodyPr vert="horz" lIns="91440" tIns="45720" rIns="91440" bIns="45720" rtlCol="0" anchor="b">
-            <a:normAutofit/>
+            <a:normAutofit lnSpcReduction="10000"/>
           </a:bodyPr>
           <a:lstStyle>
             <a:lvl1pPr algn="r" defTabSz="457200" rtl="0" eaLnBrk="1" latinLnBrk="0" hangingPunct="1">
@@ -8713,6 +8142,7 @@
             </a:lvl9pPr>
           </a:lstStyle>
           <a:p>
+            <a:pPr algn="ctr"/>
             <a:r>
               <a:rPr lang="en-US" dirty="0">
                 <a:solidFill>
@@ -8721,25 +8151,21 @@
                   </a:schemeClr>
                 </a:solidFill>
               </a:rPr>
-              <a:t>GIT </a:t>
-            </a:r>
-            <a:r>
-              <a:rPr lang="en-US" dirty="0" err="1">
+              <a:t>GIT &amp;</a:t>
+            </a:r>
+          </a:p>
+          <a:p>
+            <a:pPr algn="ctr"/>
+            <a:r>
+              <a:rPr lang="en-US" dirty="0">
                 <a:solidFill>
                   <a:schemeClr val="accent1">
                     <a:lumMod val="75000"/>
                   </a:schemeClr>
                 </a:solidFill>
               </a:rPr>
-              <a:t>segway</a:t>
-            </a:r>
-            <a:endParaRPr lang="en-US" dirty="0">
-              <a:solidFill>
-                <a:schemeClr val="accent1">
-                  <a:lumMod val="75000"/>
-                </a:schemeClr>
-              </a:solidFill>
-            </a:endParaRPr>
+              <a:t>Unity Project Creation</a:t>
+            </a:r>
           </a:p>
         </p:txBody>
       </p:sp>
@@ -9014,7 +8440,7 @@
             </a:lvl9pPr>
           </a:lstStyle>
           <a:p>
-            <a:pPr marL="457200" indent="-457200" algn="l">
+            <a:pPr marL="457200" indent="-457200" algn="ctr">
               <a:buFont typeface="Arial" panose="020B0604020202020204" pitchFamily="34" charset="0"/>
               <a:buChar char="•"/>
             </a:pPr>
@@ -9115,7 +8541,7 @@
         </p:nvSpPr>
         <p:spPr>
           <a:xfrm>
-            <a:off x="721895" y="1423738"/>
+            <a:off x="-1272840" y="298410"/>
             <a:ext cx="10018713" cy="1752599"/>
           </a:xfrm>
           <a:prstGeom prst="rect">
@@ -9204,16 +8630,24 @@
             </a:lvl9pPr>
           </a:lstStyle>
           <a:p>
-            <a:r>
-              <a:rPr lang="en-US" dirty="0">
+            <a:pPr algn="ctr"/>
+            <a:r>
+              <a:rPr lang="en-US" dirty="0" err="1">
                 <a:solidFill>
                   <a:schemeClr val="accent1">
                     <a:lumMod val="75000"/>
                   </a:schemeClr>
                 </a:solidFill>
               </a:rPr>
-              <a:t>VIDEO PLACEHOLDER</a:t>
-            </a:r>
+              <a:t>Github</a:t>
+            </a:r>
+            <a:endParaRPr lang="en-US" dirty="0">
+              <a:solidFill>
+                <a:schemeClr val="accent1">
+                  <a:lumMod val="75000"/>
+                </a:schemeClr>
+              </a:solidFill>
+            </a:endParaRPr>
           </a:p>
         </p:txBody>
       </p:sp>
@@ -9488,7 +8922,7 @@
             </a:lvl9pPr>
           </a:lstStyle>
           <a:p>
-            <a:pPr marL="457200" indent="-457200" algn="l">
+            <a:pPr marL="457200" indent="-457200" algn="ctr">
               <a:buFont typeface="Arial" panose="020B0604020202020204" pitchFamily="34" charset="0"/>
               <a:buChar char="•"/>
             </a:pPr>
@@ -9496,10 +8930,131 @@
           </a:p>
         </p:txBody>
       </p:sp>
+      <p:pic>
+        <p:nvPicPr>
+          <p:cNvPr id="3" name="Picture 2">
+            <a:extLst>
+              <a:ext uri="{FF2B5EF4-FFF2-40B4-BE49-F238E27FC236}">
+                <a16:creationId xmlns:a16="http://schemas.microsoft.com/office/drawing/2014/main" id="{D100DCA5-E2B7-4920-8A27-E92ACA9EA21A}"/>
+              </a:ext>
+            </a:extLst>
+          </p:cNvPr>
+          <p:cNvPicPr>
+            <a:picLocks noChangeAspect="1"/>
+          </p:cNvPicPr>
+          <p:nvPr/>
+        </p:nvPicPr>
+        <p:blipFill>
+          <a:blip r:embed="rId4">
+            <a:extLst>
+              <a:ext uri="{28A0092B-C50C-407E-A947-70E740481C1C}">
+                <a14:useLocalDpi xmlns:a14="http://schemas.microsoft.com/office/drawing/2010/main" val="0"/>
+              </a:ext>
+            </a:extLst>
+          </a:blip>
+          <a:stretch>
+            <a:fillRect/>
+          </a:stretch>
+        </p:blipFill>
+        <p:spPr>
+          <a:xfrm>
+            <a:off x="7182643" y="3873416"/>
+            <a:ext cx="4998720" cy="2984584"/>
+          </a:xfrm>
+          <a:prstGeom prst="rect">
+            <a:avLst/>
+          </a:prstGeom>
+        </p:spPr>
+      </p:pic>
+      <p:pic>
+        <p:nvPicPr>
+          <p:cNvPr id="6" name="Picture 5">
+            <a:extLst>
+              <a:ext uri="{FF2B5EF4-FFF2-40B4-BE49-F238E27FC236}">
+                <a16:creationId xmlns:a16="http://schemas.microsoft.com/office/drawing/2014/main" id="{23F6B4B2-65C5-4246-AC28-BD06433BEC72}"/>
+              </a:ext>
+            </a:extLst>
+          </p:cNvPr>
+          <p:cNvPicPr>
+            <a:picLocks noChangeAspect="1"/>
+          </p:cNvPicPr>
+          <p:nvPr/>
+        </p:nvPicPr>
+        <p:blipFill>
+          <a:blip r:embed="rId5">
+            <a:extLst>
+              <a:ext uri="{28A0092B-C50C-407E-A947-70E740481C1C}">
+                <a14:useLocalDpi xmlns:a14="http://schemas.microsoft.com/office/drawing/2010/main" val="0"/>
+              </a:ext>
+            </a:extLst>
+          </a:blip>
+          <a:stretch>
+            <a:fillRect/>
+          </a:stretch>
+        </p:blipFill>
+        <p:spPr>
+          <a:xfrm>
+            <a:off x="7308219" y="0"/>
+            <a:ext cx="4883781" cy="3886298"/>
+          </a:xfrm>
+          <a:prstGeom prst="rect">
+            <a:avLst/>
+          </a:prstGeom>
+        </p:spPr>
+      </p:pic>
+      <p:sp>
+        <p:nvSpPr>
+          <p:cNvPr id="7" name="TextBox 6">
+            <a:extLst>
+              <a:ext uri="{FF2B5EF4-FFF2-40B4-BE49-F238E27FC236}">
+                <a16:creationId xmlns:a16="http://schemas.microsoft.com/office/drawing/2014/main" id="{FA850439-C941-4329-8A59-DBFE27401E9F}"/>
+              </a:ext>
+            </a:extLst>
+          </p:cNvPr>
+          <p:cNvSpPr txBox="1"/>
+          <p:nvPr/>
+        </p:nvSpPr>
+        <p:spPr>
+          <a:xfrm>
+            <a:off x="2486526" y="2163360"/>
+            <a:ext cx="3881120" cy="954107"/>
+          </a:xfrm>
+          <a:prstGeom prst="rect">
+            <a:avLst/>
+          </a:prstGeom>
+          <a:noFill/>
+        </p:spPr>
+        <p:txBody>
+          <a:bodyPr wrap="square" rtlCol="0">
+            <a:spAutoFit/>
+          </a:bodyPr>
+          <a:lstStyle/>
+          <a:p>
+            <a:pPr marL="285750" indent="-285750">
+              <a:buFont typeface="Arial" panose="020B0604020202020204" pitchFamily="34" charset="0"/>
+              <a:buChar char="•"/>
+            </a:pPr>
+            <a:r>
+              <a:rPr lang="en-US" sz="2800" dirty="0"/>
+              <a:t>Desktop version</a:t>
+            </a:r>
+          </a:p>
+          <a:p>
+            <a:pPr marL="285750" indent="-285750">
+              <a:buFont typeface="Arial" panose="020B0604020202020204" pitchFamily="34" charset="0"/>
+              <a:buChar char="•"/>
+            </a:pPr>
+            <a:r>
+              <a:rPr lang="en-US" sz="2800" dirty="0"/>
+              <a:t>Website version</a:t>
+            </a:r>
+          </a:p>
+        </p:txBody>
+      </p:sp>
     </p:spTree>
     <p:extLst>
       <p:ext uri="{BB962C8B-B14F-4D97-AF65-F5344CB8AC3E}">
-        <p14:creationId xmlns:p14="http://schemas.microsoft.com/office/powerpoint/2010/main" val="2065003583"/>
+        <p14:creationId xmlns:p14="http://schemas.microsoft.com/office/powerpoint/2010/main" val="1364803506"/>
       </p:ext>
     </p:extLst>
   </p:cSld>
@@ -9589,7 +9144,7 @@
         </p:nvSpPr>
         <p:spPr>
           <a:xfrm>
-            <a:off x="721895" y="1423738"/>
+            <a:off x="-1272840" y="298410"/>
             <a:ext cx="10018713" cy="1752599"/>
           </a:xfrm>
           <a:prstGeom prst="rect">
@@ -9678,6 +9233,7 @@
             </a:lvl9pPr>
           </a:lstStyle>
           <a:p>
+            <a:pPr algn="ctr"/>
             <a:r>
               <a:rPr lang="en-US" dirty="0">
                 <a:solidFill>
@@ -9686,7 +9242,7 @@
                   </a:schemeClr>
                 </a:solidFill>
               </a:rPr>
-              <a:t>VIDEO PLACEHOLDER</a:t>
+              <a:t>Unity</a:t>
             </a:r>
           </a:p>
         </p:txBody>
@@ -9962,7 +9518,7 @@
             </a:lvl9pPr>
           </a:lstStyle>
           <a:p>
-            <a:pPr marL="457200" indent="-457200" algn="l">
+            <a:pPr marL="457200" indent="-457200" algn="ctr">
               <a:buFont typeface="Arial" panose="020B0604020202020204" pitchFamily="34" charset="0"/>
               <a:buChar char="•"/>
             </a:pPr>
@@ -9970,10 +9526,130 @@
           </a:p>
         </p:txBody>
       </p:sp>
+      <p:pic>
+        <p:nvPicPr>
+          <p:cNvPr id="4" name="Picture 3">
+            <a:extLst>
+              <a:ext uri="{FF2B5EF4-FFF2-40B4-BE49-F238E27FC236}">
+                <a16:creationId xmlns:a16="http://schemas.microsoft.com/office/drawing/2014/main" id="{91BC5CAD-6C12-4595-AB89-F42E3EEBF903}"/>
+              </a:ext>
+            </a:extLst>
+          </p:cNvPr>
+          <p:cNvPicPr>
+            <a:picLocks noChangeAspect="1"/>
+          </p:cNvPicPr>
+          <p:nvPr/>
+        </p:nvPicPr>
+        <p:blipFill>
+          <a:blip r:embed="rId4">
+            <a:extLst>
+              <a:ext uri="{28A0092B-C50C-407E-A947-70E740481C1C}">
+                <a14:useLocalDpi xmlns:a14="http://schemas.microsoft.com/office/drawing/2010/main" val="0"/>
+              </a:ext>
+            </a:extLst>
+          </a:blip>
+          <a:stretch>
+            <a:fillRect/>
+          </a:stretch>
+        </p:blipFill>
+        <p:spPr>
+          <a:xfrm>
+            <a:off x="7680918" y="3429000"/>
+            <a:ext cx="4511082" cy="3429000"/>
+          </a:xfrm>
+          <a:prstGeom prst="rect">
+            <a:avLst/>
+          </a:prstGeom>
+        </p:spPr>
+      </p:pic>
+      <p:pic>
+        <p:nvPicPr>
+          <p:cNvPr id="10" name="Picture 9">
+            <a:extLst>
+              <a:ext uri="{FF2B5EF4-FFF2-40B4-BE49-F238E27FC236}">
+                <a16:creationId xmlns:a16="http://schemas.microsoft.com/office/drawing/2014/main" id="{203ED875-1866-4138-A21E-00341A5827BD}"/>
+              </a:ext>
+            </a:extLst>
+          </p:cNvPr>
+          <p:cNvPicPr>
+            <a:picLocks noChangeAspect="1"/>
+          </p:cNvPicPr>
+          <p:nvPr/>
+        </p:nvPicPr>
+        <p:blipFill>
+          <a:blip r:embed="rId5">
+            <a:extLst>
+              <a:ext uri="{28A0092B-C50C-407E-A947-70E740481C1C}">
+                <a14:useLocalDpi xmlns:a14="http://schemas.microsoft.com/office/drawing/2010/main" val="0"/>
+              </a:ext>
+            </a:extLst>
+          </a:blip>
+          <a:stretch>
+            <a:fillRect/>
+          </a:stretch>
+        </p:blipFill>
+        <p:spPr>
+          <a:xfrm>
+            <a:off x="6294474" y="-5639"/>
+            <a:ext cx="5897526" cy="3430074"/>
+          </a:xfrm>
+          <a:prstGeom prst="rect">
+            <a:avLst/>
+          </a:prstGeom>
+        </p:spPr>
+      </p:pic>
+      <p:sp>
+        <p:nvSpPr>
+          <p:cNvPr id="11" name="Rectangle 10">
+            <a:extLst>
+              <a:ext uri="{FF2B5EF4-FFF2-40B4-BE49-F238E27FC236}">
+                <a16:creationId xmlns:a16="http://schemas.microsoft.com/office/drawing/2014/main" id="{C0ED3C7E-329D-44CC-85F3-8508B19C667C}"/>
+              </a:ext>
+            </a:extLst>
+          </p:cNvPr>
+          <p:cNvSpPr/>
+          <p:nvPr/>
+        </p:nvSpPr>
+        <p:spPr>
+          <a:xfrm>
+            <a:off x="2486526" y="2051009"/>
+            <a:ext cx="6096000" cy="954107"/>
+          </a:xfrm>
+          <a:prstGeom prst="rect">
+            <a:avLst/>
+          </a:prstGeom>
+        </p:spPr>
+        <p:txBody>
+          <a:bodyPr>
+            <a:spAutoFit/>
+          </a:bodyPr>
+          <a:lstStyle/>
+          <a:p>
+            <a:pPr marL="285750" indent="-285750">
+              <a:buFont typeface="Arial" panose="020B0604020202020204" pitchFamily="34" charset="0"/>
+              <a:buChar char="•"/>
+            </a:pPr>
+            <a:r>
+              <a:rPr lang="en-US" sz="2800" dirty="0"/>
+              <a:t>Open Button</a:t>
+            </a:r>
+          </a:p>
+          <a:p>
+            <a:pPr marL="285750" indent="-285750">
+              <a:buFont typeface="Arial" panose="020B0604020202020204" pitchFamily="34" charset="0"/>
+              <a:buChar char="•"/>
+            </a:pPr>
+            <a:r>
+              <a:rPr lang="en-US" sz="2800" dirty="0"/>
+              <a:t>Finding the project</a:t>
+            </a:r>
+          </a:p>
+        </p:txBody>
+      </p:sp>
     </p:spTree>
     <p:extLst>
       <p:ext uri="{BB962C8B-B14F-4D97-AF65-F5344CB8AC3E}">
-        <p14:creationId xmlns:p14="http://schemas.microsoft.com/office/powerpoint/2010/main" val="2333218992"/>
+        <p14:creationId xmlns:p14="http://schemas.microsoft.com/office/powerpoint/2010/main" val="3451298500"/>
       </p:ext>
     </p:extLst>
   </p:cSld>
@@ -10063,8 +9739,8 @@
         </p:nvSpPr>
         <p:spPr>
           <a:xfrm>
-            <a:off x="1588169" y="1610226"/>
-            <a:ext cx="10018713" cy="1752599"/>
+            <a:off x="1375518" y="336542"/>
+            <a:ext cx="10018713" cy="962720"/>
           </a:xfrm>
           <a:prstGeom prst="rect">
             <a:avLst/>
@@ -10073,7 +9749,7 @@
         </p:spPr>
         <p:txBody>
           <a:bodyPr vert="horz" lIns="91440" tIns="45720" rIns="91440" bIns="45720" rtlCol="0" anchor="b">
-            <a:normAutofit fontScale="70000" lnSpcReduction="20000"/>
+            <a:normAutofit lnSpcReduction="10000"/>
           </a:bodyPr>
           <a:lstStyle>
             <a:lvl1pPr algn="r" defTabSz="457200" rtl="0" eaLnBrk="1" latinLnBrk="0" hangingPunct="1">
@@ -10152,6 +9828,7 @@
             </a:lvl9pPr>
           </a:lstStyle>
           <a:p>
+            <a:pPr algn="ctr"/>
             <a:r>
               <a:rPr lang="en-US" dirty="0">
                 <a:solidFill>
@@ -10160,19 +9837,7 @@
                   </a:schemeClr>
                 </a:solidFill>
               </a:rPr>
-              <a:t>Show team progress with code snapshots</a:t>
-            </a:r>
-          </a:p>
-          <a:p>
-            <a:r>
-              <a:rPr lang="en-US" dirty="0">
-                <a:solidFill>
-                  <a:schemeClr val="accent1">
-                    <a:lumMod val="75000"/>
-                  </a:schemeClr>
-                </a:solidFill>
-              </a:rPr>
-              <a:t>map</a:t>
+              <a:t>Map</a:t>
             </a:r>
           </a:p>
         </p:txBody>
@@ -10456,6 +10121,42 @@
           </a:p>
         </p:txBody>
       </p:sp>
+      <p:pic>
+        <p:nvPicPr>
+          <p:cNvPr id="3" name="Picture 2">
+            <a:extLst>
+              <a:ext uri="{FF2B5EF4-FFF2-40B4-BE49-F238E27FC236}">
+                <a16:creationId xmlns:a16="http://schemas.microsoft.com/office/drawing/2014/main" id="{318B0AED-9900-4C4F-9AAD-A597BF919A31}"/>
+              </a:ext>
+            </a:extLst>
+          </p:cNvPr>
+          <p:cNvPicPr>
+            <a:picLocks noChangeAspect="1"/>
+          </p:cNvPicPr>
+          <p:nvPr/>
+        </p:nvPicPr>
+        <p:blipFill>
+          <a:blip r:embed="rId4">
+            <a:extLst>
+              <a:ext uri="{28A0092B-C50C-407E-A947-70E740481C1C}">
+                <a14:useLocalDpi xmlns:a14="http://schemas.microsoft.com/office/drawing/2010/main" val="0"/>
+              </a:ext>
+            </a:extLst>
+          </a:blip>
+          <a:stretch>
+            <a:fillRect/>
+          </a:stretch>
+        </p:blipFill>
+        <p:spPr>
+          <a:xfrm>
+            <a:off x="-10031" y="1477926"/>
+            <a:ext cx="12213294" cy="4909033"/>
+          </a:xfrm>
+          <a:prstGeom prst="rect">
+            <a:avLst/>
+          </a:prstGeom>
+        </p:spPr>
+      </p:pic>
     </p:spTree>
     <p:extLst>
       <p:ext uri="{BB962C8B-B14F-4D97-AF65-F5344CB8AC3E}">
@@ -10549,7 +10250,7 @@
         </p:nvSpPr>
         <p:spPr>
           <a:xfrm>
-            <a:off x="1588169" y="1610226"/>
+            <a:off x="1475082" y="202018"/>
             <a:ext cx="10018713" cy="1752599"/>
           </a:xfrm>
           <a:prstGeom prst="rect">
@@ -10559,7 +10260,7 @@
         </p:spPr>
         <p:txBody>
           <a:bodyPr vert="horz" lIns="91440" tIns="45720" rIns="91440" bIns="45720" rtlCol="0" anchor="b">
-            <a:normAutofit fontScale="70000" lnSpcReduction="20000"/>
+            <a:normAutofit/>
           </a:bodyPr>
           <a:lstStyle>
             <a:lvl1pPr algn="r" defTabSz="457200" rtl="0" eaLnBrk="1" latinLnBrk="0" hangingPunct="1">
@@ -10638,6 +10339,7 @@
             </a:lvl9pPr>
           </a:lstStyle>
           <a:p>
+            <a:pPr algn="ctr"/>
             <a:r>
               <a:rPr lang="en-US" dirty="0">
                 <a:solidFill>
@@ -10646,299 +10348,131 @@
                   </a:schemeClr>
                 </a:solidFill>
               </a:rPr>
-              <a:t>Show team progress with code snapshots</a:t>
-            </a:r>
-          </a:p>
-          <a:p>
-            <a:r>
-              <a:rPr lang="en-US" dirty="0">
-                <a:solidFill>
-                  <a:schemeClr val="accent1">
-                    <a:lumMod val="75000"/>
-                  </a:schemeClr>
-                </a:solidFill>
-              </a:rPr>
-              <a:t>enemies</a:t>
-            </a:r>
-          </a:p>
-        </p:txBody>
-      </p:sp>
-      <p:sp>
-        <p:nvSpPr>
-          <p:cNvPr id="8" name="Content Placeholder 2">
+              <a:t>Enemy and Player Movement</a:t>
+            </a:r>
+          </a:p>
+        </p:txBody>
+      </p:sp>
+      <p:sp>
+        <p:nvSpPr>
+          <p:cNvPr id="3" name="TextBox 2">
             <a:extLst>
               <a:ext uri="{FF2B5EF4-FFF2-40B4-BE49-F238E27FC236}">
-                <a16:creationId xmlns:a16="http://schemas.microsoft.com/office/drawing/2014/main" id="{F9D38175-74E0-4F9F-AFFA-E064B9750BAE}"/>
+                <a16:creationId xmlns:a16="http://schemas.microsoft.com/office/drawing/2014/main" id="{0753837A-D40D-4173-86DE-ECF2A45EF067}"/>
               </a:ext>
             </a:extLst>
           </p:cNvPr>
-          <p:cNvSpPr txBox="1">
-            <a:spLocks/>
-          </p:cNvSpPr>
+          <p:cNvSpPr txBox="1"/>
           <p:nvPr/>
         </p:nvSpPr>
         <p:spPr>
           <a:xfrm>
-            <a:off x="2173287" y="1981201"/>
-            <a:ext cx="10018713" cy="3124201"/>
+            <a:off x="7354186" y="4782236"/>
+            <a:ext cx="4837814" cy="646331"/>
+          </a:xfrm>
+          <a:prstGeom prst="rect">
+            <a:avLst/>
+          </a:prstGeom>
+          <a:noFill/>
+        </p:spPr>
+        <p:txBody>
+          <a:bodyPr wrap="square" rtlCol="0">
+            <a:spAutoFit/>
+          </a:bodyPr>
+          <a:lstStyle/>
+          <a:p>
+            <a:r>
+              <a:rPr lang="en-US" dirty="0"/>
+              <a:t>Pardon the brief interruption as I play two videos from my computer and not </a:t>
+            </a:r>
+            <a:r>
+              <a:rPr lang="en-US" dirty="0" err="1"/>
+              <a:t>powerpoint</a:t>
+            </a:r>
+            <a:endParaRPr lang="en-US" dirty="0"/>
+          </a:p>
+        </p:txBody>
+      </p:sp>
+      <p:sp>
+        <p:nvSpPr>
+          <p:cNvPr id="4" name="Rectangle 3">
+            <a:extLst>
+              <a:ext uri="{FF2B5EF4-FFF2-40B4-BE49-F238E27FC236}">
+                <a16:creationId xmlns:a16="http://schemas.microsoft.com/office/drawing/2014/main" id="{A8804E99-718C-4979-8C09-592CDE05E0D4}"/>
+              </a:ext>
+            </a:extLst>
+          </p:cNvPr>
+          <p:cNvSpPr/>
+          <p:nvPr/>
+        </p:nvSpPr>
+        <p:spPr>
+          <a:xfrm>
+            <a:off x="5330456" y="5710720"/>
+            <a:ext cx="6861544" cy="646331"/>
           </a:xfrm>
           <a:prstGeom prst="rect">
             <a:avLst/>
           </a:prstGeom>
         </p:spPr>
         <p:txBody>
-          <a:bodyPr vert="horz" lIns="91440" tIns="45720" rIns="91440" bIns="45720" rtlCol="0" anchor="t">
-            <a:normAutofit/>
+          <a:bodyPr wrap="square">
+            <a:spAutoFit/>
           </a:bodyPr>
-          <a:lstStyle>
-            <a:lvl1pPr marL="0" indent="0" algn="r" defTabSz="457200" rtl="0" eaLnBrk="1" latinLnBrk="0" hangingPunct="1">
-              <a:spcBef>
-                <a:spcPct val="20000"/>
-              </a:spcBef>
-              <a:spcAft>
-                <a:spcPts val="600"/>
-              </a:spcAft>
-              <a:buClr>
-                <a:schemeClr val="accent1">
-                  <a:lumMod val="75000"/>
-                </a:schemeClr>
-              </a:buClr>
-              <a:buSzPct val="145000"/>
-              <a:buFont typeface="Arial"/>
-              <a:buNone/>
-              <a:defRPr sz="2100" kern="1200" cap="none">
-                <a:solidFill>
-                  <a:schemeClr val="tx1"/>
-                </a:solidFill>
-                <a:effectLst/>
-                <a:latin typeface="+mn-lt"/>
-                <a:ea typeface="+mn-ea"/>
-                <a:cs typeface="+mn-cs"/>
-              </a:defRPr>
-            </a:lvl1pPr>
-            <a:lvl2pPr marL="457200" indent="0" algn="ctr" defTabSz="457200" rtl="0" eaLnBrk="1" latinLnBrk="0" hangingPunct="1">
-              <a:spcBef>
-                <a:spcPct val="20000"/>
-              </a:spcBef>
-              <a:spcAft>
-                <a:spcPts val="600"/>
-              </a:spcAft>
-              <a:buClr>
-                <a:schemeClr val="accent1">
-                  <a:lumMod val="75000"/>
-                </a:schemeClr>
-              </a:buClr>
-              <a:buSzPct val="145000"/>
-              <a:buFont typeface="Arial"/>
-              <a:buNone/>
-              <a:defRPr sz="2000" kern="1200" cap="none">
-                <a:solidFill>
-                  <a:schemeClr val="tx1">
-                    <a:tint val="75000"/>
-                  </a:schemeClr>
-                </a:solidFill>
-                <a:effectLst/>
-                <a:latin typeface="+mn-lt"/>
-                <a:ea typeface="+mn-ea"/>
-                <a:cs typeface="+mn-cs"/>
-              </a:defRPr>
-            </a:lvl2pPr>
-            <a:lvl3pPr marL="914400" indent="0" algn="ctr" defTabSz="457200" rtl="0" eaLnBrk="1" latinLnBrk="0" hangingPunct="1">
-              <a:spcBef>
-                <a:spcPct val="20000"/>
-              </a:spcBef>
-              <a:spcAft>
-                <a:spcPts val="600"/>
-              </a:spcAft>
-              <a:buClr>
-                <a:schemeClr val="accent1">
-                  <a:lumMod val="75000"/>
-                </a:schemeClr>
-              </a:buClr>
-              <a:buSzPct val="145000"/>
-              <a:buFont typeface="Arial"/>
-              <a:buNone/>
-              <a:defRPr sz="1800" kern="1200" cap="none">
-                <a:solidFill>
-                  <a:schemeClr val="tx1">
-                    <a:tint val="75000"/>
-                  </a:schemeClr>
-                </a:solidFill>
-                <a:effectLst/>
-                <a:latin typeface="+mn-lt"/>
-                <a:ea typeface="+mn-ea"/>
-                <a:cs typeface="+mn-cs"/>
-              </a:defRPr>
-            </a:lvl3pPr>
-            <a:lvl4pPr marL="1371600" indent="0" algn="ctr" defTabSz="457200" rtl="0" eaLnBrk="1" latinLnBrk="0" hangingPunct="1">
-              <a:spcBef>
-                <a:spcPct val="20000"/>
-              </a:spcBef>
-              <a:spcAft>
-                <a:spcPts val="600"/>
-              </a:spcAft>
-              <a:buClr>
-                <a:schemeClr val="accent1">
-                  <a:lumMod val="75000"/>
-                </a:schemeClr>
-              </a:buClr>
-              <a:buSzPct val="145000"/>
-              <a:buFont typeface="Arial"/>
-              <a:buNone/>
-              <a:defRPr sz="1600" kern="1200" cap="none">
-                <a:solidFill>
-                  <a:schemeClr val="tx1">
-                    <a:tint val="75000"/>
-                  </a:schemeClr>
-                </a:solidFill>
-                <a:effectLst/>
-                <a:latin typeface="+mn-lt"/>
-                <a:ea typeface="+mn-ea"/>
-                <a:cs typeface="+mn-cs"/>
-              </a:defRPr>
-            </a:lvl4pPr>
-            <a:lvl5pPr marL="1828800" indent="0" algn="ctr" defTabSz="457200" rtl="0" eaLnBrk="1" latinLnBrk="0" hangingPunct="1">
-              <a:spcBef>
-                <a:spcPct val="20000"/>
-              </a:spcBef>
-              <a:spcAft>
-                <a:spcPts val="600"/>
-              </a:spcAft>
-              <a:buClr>
-                <a:schemeClr val="accent1">
-                  <a:lumMod val="75000"/>
-                </a:schemeClr>
-              </a:buClr>
-              <a:buSzPct val="145000"/>
-              <a:buFont typeface="Arial"/>
-              <a:buNone/>
-              <a:defRPr sz="1400" kern="1200" cap="none">
-                <a:solidFill>
-                  <a:schemeClr val="tx1">
-                    <a:tint val="75000"/>
-                  </a:schemeClr>
-                </a:solidFill>
-                <a:effectLst/>
-                <a:latin typeface="+mn-lt"/>
-                <a:ea typeface="+mn-ea"/>
-                <a:cs typeface="+mn-cs"/>
-              </a:defRPr>
-            </a:lvl5pPr>
-            <a:lvl6pPr marL="2286000" indent="0" algn="ctr" defTabSz="457200" rtl="0" eaLnBrk="1" latinLnBrk="0" hangingPunct="1">
-              <a:spcBef>
-                <a:spcPct val="20000"/>
-              </a:spcBef>
-              <a:spcAft>
-                <a:spcPts val="600"/>
-              </a:spcAft>
-              <a:buClr>
-                <a:schemeClr val="accent1">
-                  <a:lumMod val="75000"/>
-                </a:schemeClr>
-              </a:buClr>
-              <a:buSzPct val="145000"/>
-              <a:buFont typeface="Arial"/>
-              <a:buNone/>
-              <a:defRPr sz="1400" kern="1200" cap="none">
-                <a:solidFill>
-                  <a:schemeClr val="tx1">
-                    <a:tint val="75000"/>
-                  </a:schemeClr>
-                </a:solidFill>
-                <a:effectLst/>
-                <a:latin typeface="+mn-lt"/>
-                <a:ea typeface="+mn-ea"/>
-                <a:cs typeface="+mn-cs"/>
-              </a:defRPr>
-            </a:lvl6pPr>
-            <a:lvl7pPr marL="2743200" indent="0" algn="ctr" defTabSz="457200" rtl="0" eaLnBrk="1" latinLnBrk="0" hangingPunct="1">
-              <a:spcBef>
-                <a:spcPct val="20000"/>
-              </a:spcBef>
-              <a:spcAft>
-                <a:spcPts val="600"/>
-              </a:spcAft>
-              <a:buClr>
-                <a:schemeClr val="accent1">
-                  <a:lumMod val="75000"/>
-                </a:schemeClr>
-              </a:buClr>
-              <a:buSzPct val="145000"/>
-              <a:buFont typeface="Arial"/>
-              <a:buNone/>
-              <a:defRPr sz="1400" kern="1200" cap="none">
-                <a:solidFill>
-                  <a:schemeClr val="tx1">
-                    <a:tint val="75000"/>
-                  </a:schemeClr>
-                </a:solidFill>
-                <a:effectLst/>
-                <a:latin typeface="+mn-lt"/>
-                <a:ea typeface="+mn-ea"/>
-                <a:cs typeface="+mn-cs"/>
-              </a:defRPr>
-            </a:lvl7pPr>
-            <a:lvl8pPr marL="3200400" indent="0" algn="ctr" defTabSz="457200" rtl="0" eaLnBrk="1" latinLnBrk="0" hangingPunct="1">
-              <a:spcBef>
-                <a:spcPct val="20000"/>
-              </a:spcBef>
-              <a:spcAft>
-                <a:spcPts val="600"/>
-              </a:spcAft>
-              <a:buClr>
-                <a:schemeClr val="accent1">
-                  <a:lumMod val="75000"/>
-                </a:schemeClr>
-              </a:buClr>
-              <a:buSzPct val="145000"/>
-              <a:buFont typeface="Arial"/>
-              <a:buNone/>
-              <a:defRPr sz="1400" kern="1200" cap="none">
-                <a:solidFill>
-                  <a:schemeClr val="tx1">
-                    <a:tint val="75000"/>
-                  </a:schemeClr>
-                </a:solidFill>
-                <a:effectLst/>
-                <a:latin typeface="+mn-lt"/>
-                <a:ea typeface="+mn-ea"/>
-                <a:cs typeface="+mn-cs"/>
-              </a:defRPr>
-            </a:lvl8pPr>
-            <a:lvl9pPr marL="3657600" indent="0" algn="ctr" defTabSz="457200" rtl="0" eaLnBrk="1" latinLnBrk="0" hangingPunct="1">
-              <a:spcBef>
-                <a:spcPct val="20000"/>
-              </a:spcBef>
-              <a:spcAft>
-                <a:spcPts val="600"/>
-              </a:spcAft>
-              <a:buClr>
-                <a:schemeClr val="accent1">
-                  <a:lumMod val="75000"/>
-                </a:schemeClr>
-              </a:buClr>
-              <a:buSzPct val="145000"/>
-              <a:buFont typeface="Arial"/>
-              <a:buNone/>
-              <a:defRPr sz="1400" kern="1200" cap="none">
-                <a:solidFill>
-                  <a:schemeClr val="tx1">
-                    <a:tint val="75000"/>
-                  </a:schemeClr>
-                </a:solidFill>
-                <a:effectLst/>
-                <a:latin typeface="+mn-lt"/>
-                <a:ea typeface="+mn-ea"/>
-                <a:cs typeface="+mn-cs"/>
-              </a:defRPr>
-            </a:lvl9pPr>
-          </a:lstStyle>
-          <a:p>
-            <a:pPr marL="457200" indent="-457200" algn="l">
-              <a:buFont typeface="Arial" panose="020B0604020202020204" pitchFamily="34" charset="0"/>
-              <a:buChar char="•"/>
-            </a:pPr>
-            <a:endParaRPr lang="en-US" sz="3200" dirty="0"/>
+          <a:lstStyle/>
+          <a:p>
+            <a:r>
+              <a:rPr lang="en-US" dirty="0">
+                <a:hlinkClick r:id="rId4"/>
+              </a:rPr>
+              <a:t>https://www.youtube.com/watch?v=R8srk9E9FCA&amp;feature=youtu.be</a:t>
+            </a:r>
+            <a:endParaRPr lang="en-US" dirty="0"/>
+          </a:p>
+          <a:p>
+            <a:endParaRPr lang="en-US" dirty="0"/>
+          </a:p>
+        </p:txBody>
+      </p:sp>
+      <p:sp>
+        <p:nvSpPr>
+          <p:cNvPr id="6" name="TextBox 5">
+            <a:extLst>
+              <a:ext uri="{FF2B5EF4-FFF2-40B4-BE49-F238E27FC236}">
+                <a16:creationId xmlns:a16="http://schemas.microsoft.com/office/drawing/2014/main" id="{EF311B82-E549-4D2E-94FB-F53267BF7DD9}"/>
+              </a:ext>
+            </a:extLst>
+          </p:cNvPr>
+          <p:cNvSpPr txBox="1"/>
+          <p:nvPr/>
+        </p:nvSpPr>
+        <p:spPr>
+          <a:xfrm>
+            <a:off x="8910084" y="6190956"/>
+            <a:ext cx="5167423" cy="369332"/>
+          </a:xfrm>
+          <a:prstGeom prst="rect">
+            <a:avLst/>
+          </a:prstGeom>
+          <a:noFill/>
+        </p:spPr>
+        <p:txBody>
+          <a:bodyPr wrap="square" rtlCol="0">
+            <a:spAutoFit/>
+          </a:bodyPr>
+          <a:lstStyle/>
+          <a:p>
+            <a:r>
+              <a:rPr lang="en-US" dirty="0"/>
+              <a:t>Somewhere </a:t>
+            </a:r>
+            <a:r>
+              <a:rPr lang="en-US"/>
+              <a:t>on my </a:t>
+            </a:r>
+            <a:r>
+              <a:rPr lang="en-US" dirty="0"/>
+              <a:t>computer</a:t>
+            </a:r>
           </a:p>
         </p:txBody>
       </p:sp>
@@ -11144,7 +10678,7 @@
                   </a:schemeClr>
                 </a:solidFill>
               </a:rPr>
-              <a:t>movement</a:t>
+              <a:t>Enemies &amp; movement</a:t>
             </a:r>
           </a:p>
         </p:txBody>
@@ -11431,7 +10965,7 @@
     </p:spTree>
     <p:extLst>
       <p:ext uri="{BB962C8B-B14F-4D97-AF65-F5344CB8AC3E}">
-        <p14:creationId xmlns:p14="http://schemas.microsoft.com/office/powerpoint/2010/main" val="3714118332"/>
+        <p14:creationId xmlns:p14="http://schemas.microsoft.com/office/powerpoint/2010/main" val="2286356766"/>
       </p:ext>
     </p:extLst>
   </p:cSld>
@@ -11618,27 +11152,7 @@
                   </a:schemeClr>
                 </a:solidFill>
               </a:rPr>
-              <a:t>Show </a:t>
-            </a:r>
-            <a:r>
-              <a:rPr lang="en-US" dirty="0" err="1">
-                <a:solidFill>
-                  <a:schemeClr val="accent1">
-                    <a:lumMod val="75000"/>
-                  </a:schemeClr>
-                </a:solidFill>
-              </a:rPr>
-              <a:t>gantt</a:t>
-            </a:r>
-            <a:r>
-              <a:rPr lang="en-US" dirty="0">
-                <a:solidFill>
-                  <a:schemeClr val="accent1">
-                    <a:lumMod val="75000"/>
-                  </a:schemeClr>
-                </a:solidFill>
-              </a:rPr>
-              <a:t> chart here</a:t>
+              <a:t>Questions?</a:t>
             </a:r>
           </a:p>
         </p:txBody>
@@ -11925,7 +11439,7 @@
     </p:spTree>
     <p:extLst>
       <p:ext uri="{BB962C8B-B14F-4D97-AF65-F5344CB8AC3E}">
-        <p14:creationId xmlns:p14="http://schemas.microsoft.com/office/powerpoint/2010/main" val="2527895033"/>
+        <p14:creationId xmlns:p14="http://schemas.microsoft.com/office/powerpoint/2010/main" val="1190623124"/>
       </p:ext>
     </p:extLst>
   </p:cSld>

</xml_diff>